<commit_message>
Updated with more code and large bug fix regarding UDP packet capture.
Stable version V1.0
</commit_message>
<xml_diff>
--- a/Demonstration/Smartwall.pptx
+++ b/Demonstration/Smartwall.pptx
@@ -6,6 +6,11 @@
   </p:sldMasterIdLst>
   <p:sldIdLst>
     <p:sldId id="256" r:id="rId2"/>
+    <p:sldId id="257" r:id="rId3"/>
+    <p:sldId id="258" r:id="rId4"/>
+    <p:sldId id="259" r:id="rId5"/>
+    <p:sldId id="260" r:id="rId6"/>
+    <p:sldId id="261" r:id="rId7"/>
   </p:sldIdLst>
   <p:sldSz cx="12192000" cy="6858000"/>
   <p:notesSz cx="6858000" cy="9144000"/>
@@ -6093,6 +6098,437 @@
 </p:sld>
 </file>
 
+<file path=ppt/slides/slide2.xml><?xml version="1.0" encoding="utf-8"?>
+<p:sld xmlns:a="http://schemas.openxmlformats.org/drawingml/2006/main" xmlns:r="http://schemas.openxmlformats.org/officeDocument/2006/relationships" xmlns:p="http://schemas.openxmlformats.org/presentationml/2006/main">
+  <p:cSld>
+    <p:spTree>
+      <p:nvGrpSpPr>
+        <p:cNvPr id="1" name=""/>
+        <p:cNvGrpSpPr/>
+        <p:nvPr/>
+      </p:nvGrpSpPr>
+      <p:grpSpPr>
+        <a:xfrm>
+          <a:off x="0" y="0"/>
+          <a:ext cx="0" cy="0"/>
+          <a:chOff x="0" y="0"/>
+          <a:chExt cx="0" cy="0"/>
+        </a:xfrm>
+      </p:grpSpPr>
+      <p:sp>
+        <p:nvSpPr>
+          <p:cNvPr id="2" name="Title 1"/>
+          <p:cNvSpPr>
+            <a:spLocks noGrp="1"/>
+          </p:cNvSpPr>
+          <p:nvPr>
+            <p:ph type="title"/>
+          </p:nvPr>
+        </p:nvSpPr>
+        <p:spPr/>
+        <p:txBody>
+          <a:bodyPr/>
+          <a:lstStyle/>
+          <a:p>
+            <a:r>
+              <a:rPr lang="en-GB" dirty="0"/>
+              <a:t>What is Smartwall?</a:t>
+            </a:r>
+          </a:p>
+        </p:txBody>
+      </p:sp>
+      <p:sp>
+        <p:nvSpPr>
+          <p:cNvPr id="6" name="Content Placeholder 5"/>
+          <p:cNvSpPr>
+            <a:spLocks noGrp="1"/>
+          </p:cNvSpPr>
+          <p:nvPr>
+            <p:ph idx="1"/>
+          </p:nvPr>
+        </p:nvSpPr>
+        <p:spPr/>
+        <p:txBody>
+          <a:bodyPr>
+            <a:normAutofit/>
+          </a:bodyPr>
+          <a:lstStyle/>
+          <a:p>
+            <a:r>
+              <a:rPr lang="en-GB" sz="3200" dirty="0"/>
+              <a:t>Package for OpenWRT</a:t>
+            </a:r>
+          </a:p>
+          <a:p>
+            <a:r>
+              <a:rPr lang="en-GB" sz="3200" dirty="0"/>
+              <a:t>Traffic logging in real time</a:t>
+            </a:r>
+          </a:p>
+          <a:p>
+            <a:r>
+              <a:rPr lang="en-GB" sz="3200" dirty="0"/>
+              <a:t>Intrusion detection and prevention on </a:t>
+            </a:r>
+            <a:r>
+              <a:rPr lang="en-GB" sz="3200" dirty="0" err="1"/>
+              <a:t>IoT</a:t>
+            </a:r>
+            <a:r>
+              <a:rPr lang="en-GB" sz="3200" dirty="0"/>
+              <a:t> devices</a:t>
+            </a:r>
+          </a:p>
+          <a:p>
+            <a:endParaRPr lang="en-GB" sz="3200" dirty="0"/>
+          </a:p>
+        </p:txBody>
+      </p:sp>
+    </p:spTree>
+    <p:extLst>
+      <p:ext uri="{BB962C8B-B14F-4D97-AF65-F5344CB8AC3E}">
+        <p14:creationId xmlns:p14="http://schemas.microsoft.com/office/powerpoint/2010/main" val="1222944153"/>
+      </p:ext>
+    </p:extLst>
+  </p:cSld>
+  <p:clrMapOvr>
+    <a:masterClrMapping/>
+  </p:clrMapOvr>
+</p:sld>
+</file>
+
+<file path=ppt/slides/slide3.xml><?xml version="1.0" encoding="utf-8"?>
+<p:sld xmlns:a="http://schemas.openxmlformats.org/drawingml/2006/main" xmlns:r="http://schemas.openxmlformats.org/officeDocument/2006/relationships" xmlns:p="http://schemas.openxmlformats.org/presentationml/2006/main">
+  <p:cSld>
+    <p:spTree>
+      <p:nvGrpSpPr>
+        <p:cNvPr id="1" name=""/>
+        <p:cNvGrpSpPr/>
+        <p:nvPr/>
+      </p:nvGrpSpPr>
+      <p:grpSpPr>
+        <a:xfrm>
+          <a:off x="0" y="0"/>
+          <a:ext cx="0" cy="0"/>
+          <a:chOff x="0" y="0"/>
+          <a:chExt cx="0" cy="0"/>
+        </a:xfrm>
+      </p:grpSpPr>
+      <p:sp>
+        <p:nvSpPr>
+          <p:cNvPr id="2" name="Title 1"/>
+          <p:cNvSpPr>
+            <a:spLocks noGrp="1"/>
+          </p:cNvSpPr>
+          <p:nvPr>
+            <p:ph type="title"/>
+          </p:nvPr>
+        </p:nvSpPr>
+        <p:spPr/>
+        <p:txBody>
+          <a:bodyPr/>
+          <a:lstStyle/>
+          <a:p>
+            <a:r>
+              <a:rPr lang="en-GB" dirty="0"/>
+              <a:t>What problem does it address?</a:t>
+            </a:r>
+          </a:p>
+        </p:txBody>
+      </p:sp>
+      <p:sp>
+        <p:nvSpPr>
+          <p:cNvPr id="3" name="Content Placeholder 2"/>
+          <p:cNvSpPr>
+            <a:spLocks noGrp="1"/>
+          </p:cNvSpPr>
+          <p:nvPr>
+            <p:ph idx="1"/>
+          </p:nvPr>
+        </p:nvSpPr>
+        <p:spPr>
+          <a:xfrm>
+            <a:off x="779929" y="1732449"/>
+            <a:ext cx="10641105" cy="4058751"/>
+          </a:xfrm>
+        </p:spPr>
+        <p:txBody>
+          <a:bodyPr>
+            <a:normAutofit/>
+          </a:bodyPr>
+          <a:lstStyle/>
+          <a:p>
+            <a:r>
+              <a:rPr lang="en-GB" sz="3200" dirty="0"/>
+              <a:t>Danger of low security </a:t>
+            </a:r>
+            <a:r>
+              <a:rPr lang="en-GB" sz="3200" dirty="0" err="1"/>
+              <a:t>IoT</a:t>
+            </a:r>
+            <a:r>
+              <a:rPr lang="en-GB" sz="3200" dirty="0"/>
+              <a:t> devices being compromised</a:t>
+            </a:r>
+          </a:p>
+          <a:p>
+            <a:r>
+              <a:rPr lang="en-GB" sz="3200" dirty="0"/>
+              <a:t>Lack of clarity on what a device is talking to internally and externally on a network.</a:t>
+            </a:r>
+          </a:p>
+          <a:p>
+            <a:r>
+              <a:rPr lang="en-GB" sz="3200" dirty="0"/>
+              <a:t>Risk of being exploited as part of a botnet attack (</a:t>
+            </a:r>
+            <a:r>
+              <a:rPr lang="en-GB" sz="3200" dirty="0" err="1"/>
+              <a:t>ie</a:t>
+            </a:r>
+            <a:r>
+              <a:rPr lang="en-GB" sz="3200" dirty="0"/>
+              <a:t> </a:t>
+            </a:r>
+            <a:r>
+              <a:rPr lang="en-GB" sz="3200" dirty="0" err="1"/>
+              <a:t>Mirai</a:t>
+            </a:r>
+            <a:r>
+              <a:rPr lang="en-GB" sz="3200" dirty="0"/>
+              <a:t>)</a:t>
+            </a:r>
+          </a:p>
+        </p:txBody>
+      </p:sp>
+    </p:spTree>
+    <p:extLst>
+      <p:ext uri="{BB962C8B-B14F-4D97-AF65-F5344CB8AC3E}">
+        <p14:creationId xmlns:p14="http://schemas.microsoft.com/office/powerpoint/2010/main" val="3635839948"/>
+      </p:ext>
+    </p:extLst>
+  </p:cSld>
+  <p:clrMapOvr>
+    <a:masterClrMapping/>
+  </p:clrMapOvr>
+</p:sld>
+</file>
+
+<file path=ppt/slides/slide4.xml><?xml version="1.0" encoding="utf-8"?>
+<p:sld xmlns:a="http://schemas.openxmlformats.org/drawingml/2006/main" xmlns:r="http://schemas.openxmlformats.org/officeDocument/2006/relationships" xmlns:p="http://schemas.openxmlformats.org/presentationml/2006/main">
+  <p:cSld>
+    <p:spTree>
+      <p:nvGrpSpPr>
+        <p:cNvPr id="1" name=""/>
+        <p:cNvGrpSpPr/>
+        <p:nvPr/>
+      </p:nvGrpSpPr>
+      <p:grpSpPr>
+        <a:xfrm>
+          <a:off x="0" y="0"/>
+          <a:ext cx="0" cy="0"/>
+          <a:chOff x="0" y="0"/>
+          <a:chExt cx="0" cy="0"/>
+        </a:xfrm>
+      </p:grpSpPr>
+      <p:sp>
+        <p:nvSpPr>
+          <p:cNvPr id="2" name="Title 1"/>
+          <p:cNvSpPr>
+            <a:spLocks noGrp="1"/>
+          </p:cNvSpPr>
+          <p:nvPr>
+            <p:ph type="title"/>
+          </p:nvPr>
+        </p:nvSpPr>
+        <p:spPr/>
+        <p:txBody>
+          <a:bodyPr/>
+          <a:lstStyle/>
+          <a:p>
+            <a:r>
+              <a:rPr lang="en-GB" dirty="0"/>
+              <a:t>How does it address these?</a:t>
+            </a:r>
+          </a:p>
+        </p:txBody>
+      </p:sp>
+      <p:sp>
+        <p:nvSpPr>
+          <p:cNvPr id="3" name="Content Placeholder 2"/>
+          <p:cNvSpPr>
+            <a:spLocks noGrp="1"/>
+          </p:cNvSpPr>
+          <p:nvPr>
+            <p:ph idx="1"/>
+          </p:nvPr>
+        </p:nvSpPr>
+        <p:spPr/>
+        <p:txBody>
+          <a:bodyPr/>
+          <a:lstStyle/>
+          <a:p>
+            <a:r>
+              <a:rPr lang="en-GB" sz="3200" dirty="0"/>
+              <a:t>Full home monitoring on connections in the home</a:t>
+            </a:r>
+          </a:p>
+          <a:p>
+            <a:r>
+              <a:rPr lang="en-GB" sz="3200" dirty="0"/>
+              <a:t>Direct control over devices’ allowed connections</a:t>
+            </a:r>
+          </a:p>
+          <a:p>
+            <a:r>
+              <a:rPr lang="en-GB" sz="3200" dirty="0"/>
+              <a:t>Behavioural based warnings </a:t>
+            </a:r>
+            <a:r>
+              <a:rPr lang="en-GB" sz="3200"/>
+              <a:t>on devices’ </a:t>
+            </a:r>
+            <a:r>
+              <a:rPr lang="en-GB" sz="3200" dirty="0"/>
+              <a:t>connections</a:t>
+            </a:r>
+          </a:p>
+          <a:p>
+            <a:endParaRPr lang="en-GB" dirty="0"/>
+          </a:p>
+        </p:txBody>
+      </p:sp>
+    </p:spTree>
+    <p:extLst>
+      <p:ext uri="{BB962C8B-B14F-4D97-AF65-F5344CB8AC3E}">
+        <p14:creationId xmlns:p14="http://schemas.microsoft.com/office/powerpoint/2010/main" val="3120616144"/>
+      </p:ext>
+    </p:extLst>
+  </p:cSld>
+  <p:clrMapOvr>
+    <a:masterClrMapping/>
+  </p:clrMapOvr>
+</p:sld>
+</file>
+
+<file path=ppt/slides/slide5.xml><?xml version="1.0" encoding="utf-8"?>
+<p:sld xmlns:a="http://schemas.openxmlformats.org/drawingml/2006/main" xmlns:r="http://schemas.openxmlformats.org/officeDocument/2006/relationships" xmlns:p="http://schemas.openxmlformats.org/presentationml/2006/main">
+  <p:cSld>
+    <p:spTree>
+      <p:nvGrpSpPr>
+        <p:cNvPr id="1" name=""/>
+        <p:cNvGrpSpPr/>
+        <p:nvPr/>
+      </p:nvGrpSpPr>
+      <p:grpSpPr>
+        <a:xfrm>
+          <a:off x="0" y="0"/>
+          <a:ext cx="0" cy="0"/>
+          <a:chOff x="0" y="0"/>
+          <a:chExt cx="0" cy="0"/>
+        </a:xfrm>
+      </p:grpSpPr>
+      <p:sp>
+        <p:nvSpPr>
+          <p:cNvPr id="2" name="Title 1"/>
+          <p:cNvSpPr>
+            <a:spLocks noGrp="1"/>
+          </p:cNvSpPr>
+          <p:nvPr>
+            <p:ph type="title"/>
+          </p:nvPr>
+        </p:nvSpPr>
+        <p:spPr>
+          <a:xfrm>
+            <a:off x="1057230" y="2720789"/>
+            <a:ext cx="10353762" cy="970450"/>
+          </a:xfrm>
+        </p:spPr>
+        <p:txBody>
+          <a:bodyPr>
+            <a:noAutofit/>
+          </a:bodyPr>
+          <a:lstStyle/>
+          <a:p>
+            <a:r>
+              <a:rPr lang="en-GB" sz="11500" dirty="0"/>
+              <a:t>Demonstration</a:t>
+            </a:r>
+          </a:p>
+        </p:txBody>
+      </p:sp>
+    </p:spTree>
+    <p:extLst>
+      <p:ext uri="{BB962C8B-B14F-4D97-AF65-F5344CB8AC3E}">
+        <p14:creationId xmlns:p14="http://schemas.microsoft.com/office/powerpoint/2010/main" val="2316336252"/>
+      </p:ext>
+    </p:extLst>
+  </p:cSld>
+  <p:clrMapOvr>
+    <a:masterClrMapping/>
+  </p:clrMapOvr>
+</p:sld>
+</file>
+
+<file path=ppt/slides/slide6.xml><?xml version="1.0" encoding="utf-8"?>
+<p:sld xmlns:a="http://schemas.openxmlformats.org/drawingml/2006/main" xmlns:r="http://schemas.openxmlformats.org/officeDocument/2006/relationships" xmlns:p="http://schemas.openxmlformats.org/presentationml/2006/main">
+  <p:cSld>
+    <p:spTree>
+      <p:nvGrpSpPr>
+        <p:cNvPr id="1" name=""/>
+        <p:cNvGrpSpPr/>
+        <p:nvPr/>
+      </p:nvGrpSpPr>
+      <p:grpSpPr>
+        <a:xfrm>
+          <a:off x="0" y="0"/>
+          <a:ext cx="0" cy="0"/>
+          <a:chOff x="0" y="0"/>
+          <a:chExt cx="0" cy="0"/>
+        </a:xfrm>
+      </p:grpSpPr>
+      <p:sp>
+        <p:nvSpPr>
+          <p:cNvPr id="2" name="Title 1"/>
+          <p:cNvSpPr>
+            <a:spLocks noGrp="1"/>
+          </p:cNvSpPr>
+          <p:nvPr>
+            <p:ph type="title"/>
+          </p:nvPr>
+        </p:nvSpPr>
+        <p:spPr>
+          <a:xfrm>
+            <a:off x="913795" y="2693907"/>
+            <a:ext cx="10353762" cy="970450"/>
+          </a:xfrm>
+        </p:spPr>
+        <p:txBody>
+          <a:bodyPr>
+            <a:noAutofit/>
+          </a:bodyPr>
+          <a:lstStyle/>
+          <a:p>
+            <a:r>
+              <a:rPr lang="en-GB" sz="11500" dirty="0"/>
+              <a:t>Questions?</a:t>
+            </a:r>
+          </a:p>
+        </p:txBody>
+      </p:sp>
+    </p:spTree>
+    <p:extLst>
+      <p:ext uri="{BB962C8B-B14F-4D97-AF65-F5344CB8AC3E}">
+        <p14:creationId xmlns:p14="http://schemas.microsoft.com/office/powerpoint/2010/main" val="343601121"/>
+      </p:ext>
+    </p:extLst>
+  </p:cSld>
+  <p:clrMapOvr>
+    <a:masterClrMapping/>
+  </p:clrMapOvr>
+</p:sld>
+</file>
+
 <file path=ppt/theme/theme1.xml><?xml version="1.0" encoding="utf-8"?>
 <a:theme xmlns:a="http://schemas.openxmlformats.org/drawingml/2006/main" name="Slate">
   <a:themeElements>

</xml_diff>